<commit_message>
manually added changes from earlier branch
</commit_message>
<xml_diff>
--- a/Whiteboard design session/WDS trainer presentation - Azure Stack.pptx
+++ b/Whiteboard design session/WDS trainer presentation - Azure Stack.pptx
@@ -182,20 +182,6 @@
 </p1510:revInfo>
 </file>
 
-<file path=ppt/comments/comment1.xml><?xml version="1.0" encoding="utf-8"?>
-<p:cmLst xmlns:a="http://schemas.openxmlformats.org/drawingml/2006/main" xmlns:r="http://schemas.openxmlformats.org/officeDocument/2006/relationships" xmlns:p="http://schemas.openxmlformats.org/presentationml/2006/main">
-  <p:cm authorId="3" dt="2018-05-01T19:55:09.513" idx="1">
-    <p:pos x="10" y="10"/>
-    <p:text>Sent meail to Michael and James re tech accuracy of this slide.</p:text>
-    <p:extLst>
-      <p:ext uri="{C676402C-5697-4E1C-873F-D02D1690AC5C}">
-        <p15:threadingInfo xmlns:p15="http://schemas.microsoft.com/office/powerpoint/2012/main" timeZoneBias="420"/>
-      </p:ext>
-    </p:extLst>
-  </p:cm>
-</p:cmLst>
-</file>
-
 <file path=ppt/notesMasters/notesMaster1.xml><?xml version="1.0" encoding="utf-8"?>
 <p:notesMaster xmlns:a="http://schemas.openxmlformats.org/drawingml/2006/main" xmlns:r="http://schemas.openxmlformats.org/officeDocument/2006/relationships" xmlns:p="http://schemas.openxmlformats.org/presentationml/2006/main">
   <p:cSld>
@@ -278,7 +264,7 @@
           <a:p>
             <a:fld id="{52A13B17-C506-4D51-BB37-16B365906619}" type="datetimeFigureOut">
               <a:rPr lang="en-US" smtClean="0"/>
-              <a:t>6/7/2018</a:t>
+              <a:t>7/13/2018</a:t>
             </a:fld>
             <a:endParaRPr lang="en-US"/>
           </a:p>
@@ -3116,7 +3102,7 @@
                   <a:prstClr val="black"/>
                 </a:solidFill>
               </a:rPr>
-              <a:t>6/7/2018 11:33 AM</a:t>
+              <a:t>7/13/2018 3:53 PM</a:t>
             </a:fld>
             <a:endParaRPr lang="en-US" dirty="0">
               <a:solidFill>
@@ -19150,7 +19136,7 @@
             </a:pPr>
             <a:r>
               <a:rPr lang="en-US" sz="2800" dirty="0"/>
-              <a:t>Can expand to other tenants for other countries in the region</a:t>
+              <a:t>Can expand to other tenants for other countries/regions in the area</a:t>
             </a:r>
           </a:p>
           <a:p>
@@ -24805,24 +24791,6 @@
 </file>
 
 <file path=customXml/item1.xml><?xml version="1.0" encoding="utf-8"?>
-<?mso-contentType ?>
-<FormTemplates xmlns="http://schemas.microsoft.com/sharepoint/v3/contenttype/forms">
-  <Display>DocumentLibraryForm</Display>
-  <Edit>DocumentLibraryForm</Edit>
-  <New>DocumentLibraryForm</New>
-</FormTemplates>
-</file>
-
-<file path=customXml/item2.xml><?xml version="1.0" encoding="utf-8"?>
-<p:properties xmlns:p="http://schemas.microsoft.com/office/2006/metadata/properties" xmlns:xsi="http://www.w3.org/2001/XMLSchema-instance" xmlns:pc="http://schemas.microsoft.com/office/infopath/2007/PartnerControls">
-  <documentManagement>
-    <_ip_UnifiedCompliancePolicyUIAction xmlns="http://schemas.microsoft.com/sharepoint/v3" xsi:nil="true"/>
-    <_ip_UnifiedCompliancePolicyProperties xmlns="http://schemas.microsoft.com/sharepoint/v3" xsi:nil="true"/>
-  </documentManagement>
-</p:properties>
-</file>
-
-<file path=customXml/item3.xml><?xml version="1.0" encoding="utf-8"?>
 <ct:contentTypeSchema xmlns:ct="http://schemas.microsoft.com/office/2006/metadata/contentType" xmlns:ma="http://schemas.microsoft.com/office/2006/metadata/properties/metaAttributes" ct:_="" ma:_="" ma:contentTypeName="Document" ma:contentTypeID="0x010100D15DFA3690A15B4081582BBCC6BEAC3E" ma:contentTypeVersion="9" ma:contentTypeDescription="Create a new document." ma:contentTypeScope="" ma:versionID="642da1784587cbe85a7fdbbe4dc36103">
   <xsd:schema xmlns:xsd="http://www.w3.org/2001/XMLSchema" xmlns:xs="http://www.w3.org/2001/XMLSchema" xmlns:p="http://schemas.microsoft.com/office/2006/metadata/properties" xmlns:ns1="http://schemas.microsoft.com/sharepoint/v3" xmlns:ns2="2023ac63-7b75-4916-a9ee-591457758eee" xmlns:ns3="d9c797ad-d7c3-4982-82b7-81352a75e4a5" targetNamespace="http://schemas.microsoft.com/office/2006/metadata/properties" ma:root="true" ma:fieldsID="91198b0246576053cc55dd2c67035a89" ns1:_="" ns2:_="" ns3:_="">
     <xsd:import namespace="http://schemas.microsoft.com/sharepoint/v3"/>
@@ -25024,10 +24992,40 @@
 </ct:contentTypeSchema>
 </file>
 
+<file path=customXml/item2.xml><?xml version="1.0" encoding="utf-8"?>
+<p:properties xmlns:p="http://schemas.microsoft.com/office/2006/metadata/properties" xmlns:xsi="http://www.w3.org/2001/XMLSchema-instance" xmlns:pc="http://schemas.microsoft.com/office/infopath/2007/PartnerControls">
+  <documentManagement>
+    <_ip_UnifiedCompliancePolicyUIAction xmlns="http://schemas.microsoft.com/sharepoint/v3" xsi:nil="true"/>
+    <_ip_UnifiedCompliancePolicyProperties xmlns="http://schemas.microsoft.com/sharepoint/v3" xsi:nil="true"/>
+  </documentManagement>
+</p:properties>
+</file>
+
+<file path=customXml/item3.xml><?xml version="1.0" encoding="utf-8"?>
+<?mso-contentType ?>
+<FormTemplates xmlns="http://schemas.microsoft.com/sharepoint/v3/contenttype/forms">
+  <Display>DocumentLibraryForm</Display>
+  <Edit>DocumentLibraryForm</Edit>
+  <New>DocumentLibraryForm</New>
+</FormTemplates>
+</file>
+
 <file path=customXml/itemProps1.xml><?xml version="1.0" encoding="utf-8"?>
-<ds:datastoreItem xmlns:ds="http://schemas.openxmlformats.org/officeDocument/2006/customXml" ds:itemID="{F18501AF-04CF-4482-BAE1-607B49DDC378}">
+<ds:datastoreItem xmlns:ds="http://schemas.openxmlformats.org/officeDocument/2006/customXml" ds:itemID="{255F5BEB-6AD6-480A-8556-C80C5EBC10F2}">
   <ds:schemaRefs>
-    <ds:schemaRef ds:uri="http://schemas.microsoft.com/sharepoint/v3/contenttype/forms"/>
+    <ds:schemaRef ds:uri="http://schemas.microsoft.com/office/2006/metadata/contentType"/>
+    <ds:schemaRef ds:uri="http://schemas.microsoft.com/office/2006/metadata/properties/metaAttributes"/>
+    <ds:schemaRef ds:uri="http://www.w3.org/2001/XMLSchema"/>
+    <ds:schemaRef ds:uri="http://schemas.microsoft.com/office/2006/metadata/properties"/>
+    <ds:schemaRef ds:uri="http://schemas.microsoft.com/sharepoint/v3"/>
+    <ds:schemaRef ds:uri="2023ac63-7b75-4916-a9ee-591457758eee"/>
+    <ds:schemaRef ds:uri="d9c797ad-d7c3-4982-82b7-81352a75e4a5"/>
+    <ds:schemaRef ds:uri="http://schemas.microsoft.com/office/2006/documentManagement/types"/>
+    <ds:schemaRef ds:uri="http://schemas.microsoft.com/office/infopath/2007/PartnerControls"/>
+    <ds:schemaRef ds:uri="http://schemas.openxmlformats.org/package/2006/metadata/core-properties"/>
+    <ds:schemaRef ds:uri="http://purl.org/dc/elements/1.1/"/>
+    <ds:schemaRef ds:uri="http://purl.org/dc/terms/"/>
+    <ds:schemaRef ds:uri="http://schemas.microsoft.com/internal/obd"/>
   </ds:schemaRefs>
 </ds:datastoreItem>
 </file>
@@ -25051,21 +25049,9 @@
 </file>
 
 <file path=customXml/itemProps3.xml><?xml version="1.0" encoding="utf-8"?>
-<ds:datastoreItem xmlns:ds="http://schemas.openxmlformats.org/officeDocument/2006/customXml" ds:itemID="{255F5BEB-6AD6-480A-8556-C80C5EBC10F2}">
+<ds:datastoreItem xmlns:ds="http://schemas.openxmlformats.org/officeDocument/2006/customXml" ds:itemID="{F18501AF-04CF-4482-BAE1-607B49DDC378}">
   <ds:schemaRefs>
-    <ds:schemaRef ds:uri="http://schemas.microsoft.com/office/2006/metadata/contentType"/>
-    <ds:schemaRef ds:uri="http://schemas.microsoft.com/office/2006/metadata/properties/metaAttributes"/>
-    <ds:schemaRef ds:uri="http://www.w3.org/2001/XMLSchema"/>
-    <ds:schemaRef ds:uri="http://schemas.microsoft.com/office/2006/metadata/properties"/>
-    <ds:schemaRef ds:uri="http://schemas.microsoft.com/sharepoint/v3"/>
-    <ds:schemaRef ds:uri="2023ac63-7b75-4916-a9ee-591457758eee"/>
-    <ds:schemaRef ds:uri="d9c797ad-d7c3-4982-82b7-81352a75e4a5"/>
-    <ds:schemaRef ds:uri="http://schemas.microsoft.com/office/2006/documentManagement/types"/>
-    <ds:schemaRef ds:uri="http://schemas.microsoft.com/office/infopath/2007/PartnerControls"/>
-    <ds:schemaRef ds:uri="http://schemas.openxmlformats.org/package/2006/metadata/core-properties"/>
-    <ds:schemaRef ds:uri="http://purl.org/dc/elements/1.1/"/>
-    <ds:schemaRef ds:uri="http://purl.org/dc/terms/"/>
-    <ds:schemaRef ds:uri="http://schemas.microsoft.com/internal/obd"/>
+    <ds:schemaRef ds:uri="http://schemas.microsoft.com/sharepoint/v3/contenttype/forms"/>
   </ds:schemaRefs>
 </ds:datastoreItem>
 </file>
</xml_diff>